<commit_message>
finalizado powerpoint e pdf
</commit_message>
<xml_diff>
--- a/trabalhofinal.pptx
+++ b/trabalhofinal.pptx
@@ -13,6 +13,20 @@
     <p:sldId id="261" r:id="rId7"/>
     <p:sldId id="262" r:id="rId8"/>
     <p:sldId id="263" r:id="rId9"/>
+    <p:sldId id="264" r:id="rId10"/>
+    <p:sldId id="265" r:id="rId11"/>
+    <p:sldId id="266" r:id="rId12"/>
+    <p:sldId id="267" r:id="rId13"/>
+    <p:sldId id="268" r:id="rId14"/>
+    <p:sldId id="269" r:id="rId15"/>
+    <p:sldId id="270" r:id="rId16"/>
+    <p:sldId id="271" r:id="rId17"/>
+    <p:sldId id="272" r:id="rId18"/>
+    <p:sldId id="273" r:id="rId19"/>
+    <p:sldId id="274" r:id="rId20"/>
+    <p:sldId id="277" r:id="rId21"/>
+    <p:sldId id="275" r:id="rId22"/>
+    <p:sldId id="276" r:id="rId23"/>
   </p:sldIdLst>
   <p:sldSz cx="12192000" cy="6858000"/>
   <p:notesSz cx="6858000" cy="9144000"/>
@@ -3423,6 +3437,1498 @@
 </p:sld>
 </file>
 
+<file path=ppt/slides/slide10.xml><?xml version="1.0" encoding="utf-8"?>
+<p:sld xmlns:a="http://schemas.openxmlformats.org/drawingml/2006/main" xmlns:r="http://schemas.openxmlformats.org/officeDocument/2006/relationships" xmlns:p="http://schemas.openxmlformats.org/presentationml/2006/main">
+  <p:cSld>
+    <p:spTree>
+      <p:nvGrpSpPr>
+        <p:cNvPr id="1" name=""/>
+        <p:cNvGrpSpPr/>
+        <p:nvPr/>
+      </p:nvGrpSpPr>
+      <p:grpSpPr>
+        <a:xfrm>
+          <a:off x="0" y="0"/>
+          <a:ext cx="0" cy="0"/>
+          <a:chOff x="0" y="0"/>
+          <a:chExt cx="0" cy="0"/>
+        </a:xfrm>
+      </p:grpSpPr>
+      <p:sp>
+        <p:nvSpPr>
+          <p:cNvPr id="2" name="Title 1">
+            <a:extLst>
+              <a:ext uri="{FF2B5EF4-FFF2-40B4-BE49-F238E27FC236}">
+                <a16:creationId xmlns:a16="http://schemas.microsoft.com/office/drawing/2014/main" id="{68CDD0B5-DB7D-0BE8-DF92-065628F87AD0}"/>
+              </a:ext>
+            </a:extLst>
+          </p:cNvPr>
+          <p:cNvSpPr>
+            <a:spLocks noGrp="1"/>
+          </p:cNvSpPr>
+          <p:nvPr>
+            <p:ph type="title"/>
+          </p:nvPr>
+        </p:nvSpPr>
+        <p:spPr/>
+        <p:txBody>
+          <a:bodyPr/>
+          <a:lstStyle/>
+          <a:p>
+            <a:endParaRPr lang="pt-BR"/>
+          </a:p>
+        </p:txBody>
+      </p:sp>
+      <p:sp>
+        <p:nvSpPr>
+          <p:cNvPr id="3" name="Content Placeholder 2">
+            <a:extLst>
+              <a:ext uri="{FF2B5EF4-FFF2-40B4-BE49-F238E27FC236}">
+                <a16:creationId xmlns:a16="http://schemas.microsoft.com/office/drawing/2014/main" id="{FB620D06-2828-C344-6AF5-4562AA12C950}"/>
+              </a:ext>
+            </a:extLst>
+          </p:cNvPr>
+          <p:cNvSpPr>
+            <a:spLocks noGrp="1"/>
+          </p:cNvSpPr>
+          <p:nvPr>
+            <p:ph idx="1"/>
+          </p:nvPr>
+        </p:nvSpPr>
+        <p:spPr/>
+        <p:txBody>
+          <a:bodyPr/>
+          <a:lstStyle/>
+          <a:p>
+            <a:endParaRPr lang="pt-BR"/>
+          </a:p>
+        </p:txBody>
+      </p:sp>
+      <p:pic>
+        <p:nvPicPr>
+          <p:cNvPr id="5" name="Picture 4">
+            <a:extLst>
+              <a:ext uri="{FF2B5EF4-FFF2-40B4-BE49-F238E27FC236}">
+                <a16:creationId xmlns:a16="http://schemas.microsoft.com/office/drawing/2014/main" id="{ECC130D9-449A-802D-F83B-0A22CF573070}"/>
+              </a:ext>
+            </a:extLst>
+          </p:cNvPr>
+          <p:cNvPicPr>
+            <a:picLocks noChangeAspect="1"/>
+          </p:cNvPicPr>
+          <p:nvPr/>
+        </p:nvPicPr>
+        <p:blipFill>
+          <a:blip r:embed="rId2"/>
+          <a:stretch>
+            <a:fillRect/>
+          </a:stretch>
+        </p:blipFill>
+        <p:spPr>
+          <a:xfrm>
+            <a:off x="2667000" y="0"/>
+            <a:ext cx="6858000" cy="6858000"/>
+          </a:xfrm>
+          <a:prstGeom prst="rect">
+            <a:avLst/>
+          </a:prstGeom>
+        </p:spPr>
+      </p:pic>
+    </p:spTree>
+    <p:extLst>
+      <p:ext uri="{BB962C8B-B14F-4D97-AF65-F5344CB8AC3E}">
+        <p14:creationId xmlns:p14="http://schemas.microsoft.com/office/powerpoint/2010/main" val="35304018"/>
+      </p:ext>
+    </p:extLst>
+  </p:cSld>
+  <p:clrMapOvr>
+    <a:masterClrMapping/>
+  </p:clrMapOvr>
+</p:sld>
+</file>
+
+<file path=ppt/slides/slide11.xml><?xml version="1.0" encoding="utf-8"?>
+<p:sld xmlns:a="http://schemas.openxmlformats.org/drawingml/2006/main" xmlns:r="http://schemas.openxmlformats.org/officeDocument/2006/relationships" xmlns:p="http://schemas.openxmlformats.org/presentationml/2006/main">
+  <p:cSld>
+    <p:spTree>
+      <p:nvGrpSpPr>
+        <p:cNvPr id="1" name="">
+          <a:extLst>
+            <a:ext uri="{FF2B5EF4-FFF2-40B4-BE49-F238E27FC236}">
+              <a16:creationId xmlns:a16="http://schemas.microsoft.com/office/drawing/2014/main" id="{B945F011-295C-4EE8-3750-09A77E22FF3A}"/>
+            </a:ext>
+          </a:extLst>
+        </p:cNvPr>
+        <p:cNvGrpSpPr/>
+        <p:nvPr/>
+      </p:nvGrpSpPr>
+      <p:grpSpPr>
+        <a:xfrm>
+          <a:off x="0" y="0"/>
+          <a:ext cx="0" cy="0"/>
+          <a:chOff x="0" y="0"/>
+          <a:chExt cx="0" cy="0"/>
+        </a:xfrm>
+      </p:grpSpPr>
+      <p:sp>
+        <p:nvSpPr>
+          <p:cNvPr id="2" name="Title 1">
+            <a:extLst>
+              <a:ext uri="{FF2B5EF4-FFF2-40B4-BE49-F238E27FC236}">
+                <a16:creationId xmlns:a16="http://schemas.microsoft.com/office/drawing/2014/main" id="{A5291B3F-D6CA-50B0-2DEB-509CABA55D0E}"/>
+              </a:ext>
+            </a:extLst>
+          </p:cNvPr>
+          <p:cNvSpPr>
+            <a:spLocks noGrp="1"/>
+          </p:cNvSpPr>
+          <p:nvPr>
+            <p:ph type="title"/>
+          </p:nvPr>
+        </p:nvSpPr>
+        <p:spPr/>
+        <p:txBody>
+          <a:bodyPr/>
+          <a:lstStyle/>
+          <a:p>
+            <a:r>
+              <a:rPr lang="pt-BR" noProof="0" dirty="0" err="1"/>
+              <a:t>Hiperparâmetros</a:t>
+            </a:r>
+            <a:endParaRPr lang="pt-BR" noProof="0" dirty="0"/>
+          </a:p>
+        </p:txBody>
+      </p:sp>
+      <p:sp>
+        <p:nvSpPr>
+          <p:cNvPr id="3" name="Content Placeholder 2">
+            <a:extLst>
+              <a:ext uri="{FF2B5EF4-FFF2-40B4-BE49-F238E27FC236}">
+                <a16:creationId xmlns:a16="http://schemas.microsoft.com/office/drawing/2014/main" id="{77C2EACD-D6B4-915D-4DB1-C699495D2465}"/>
+              </a:ext>
+            </a:extLst>
+          </p:cNvPr>
+          <p:cNvSpPr>
+            <a:spLocks noGrp="1"/>
+          </p:cNvSpPr>
+          <p:nvPr>
+            <p:ph idx="1"/>
+          </p:nvPr>
+        </p:nvSpPr>
+        <p:spPr/>
+        <p:txBody>
+          <a:bodyPr>
+            <a:normAutofit/>
+          </a:bodyPr>
+          <a:lstStyle/>
+          <a:p>
+            <a:r>
+              <a:rPr lang="pt-BR" noProof="0" dirty="0"/>
+              <a:t>Utilizei o teste do cotovelo, silhueta, e índice </a:t>
+            </a:r>
+            <a:r>
+              <a:rPr lang="pt-BR" noProof="0" dirty="0" err="1"/>
+              <a:t>Calinski-hazabasz</a:t>
+            </a:r>
+            <a:endParaRPr lang="pt-BR" noProof="0" dirty="0"/>
+          </a:p>
+          <a:p>
+            <a:pPr marL="0" indent="0">
+              <a:buNone/>
+            </a:pPr>
+            <a:r>
+              <a:rPr lang="pt-BR" noProof="0" dirty="0"/>
+              <a:t>Cotovelo sugeriu 3 clusters, os demais 2. Optei por 3</a:t>
+            </a:r>
+          </a:p>
+          <a:p>
+            <a:r>
+              <a:rPr lang="pt-BR" dirty="0"/>
+              <a:t>Fiz os testes para todos os </a:t>
+            </a:r>
+            <a:r>
+              <a:rPr lang="pt-BR" dirty="0" err="1"/>
+              <a:t>dataframes</a:t>
+            </a:r>
+            <a:r>
+              <a:rPr lang="pt-BR" dirty="0"/>
+              <a:t> divididos por ano, apresentando o mesmo resultado.</a:t>
+            </a:r>
+            <a:endParaRPr lang="pt-BR" noProof="0" dirty="0"/>
+          </a:p>
+          <a:p>
+            <a:pPr marL="0" indent="0">
+              <a:buNone/>
+            </a:pPr>
+            <a:endParaRPr lang="pt-BR" noProof="0" dirty="0"/>
+          </a:p>
+        </p:txBody>
+      </p:sp>
+    </p:spTree>
+    <p:extLst>
+      <p:ext uri="{BB962C8B-B14F-4D97-AF65-F5344CB8AC3E}">
+        <p14:creationId xmlns:p14="http://schemas.microsoft.com/office/powerpoint/2010/main" val="1987857047"/>
+      </p:ext>
+    </p:extLst>
+  </p:cSld>
+  <p:clrMapOvr>
+    <a:masterClrMapping/>
+  </p:clrMapOvr>
+</p:sld>
+</file>
+
+<file path=ppt/slides/slide12.xml><?xml version="1.0" encoding="utf-8"?>
+<p:sld xmlns:a="http://schemas.openxmlformats.org/drawingml/2006/main" xmlns:r="http://schemas.openxmlformats.org/officeDocument/2006/relationships" xmlns:p="http://schemas.openxmlformats.org/presentationml/2006/main">
+  <p:cSld>
+    <p:spTree>
+      <p:nvGrpSpPr>
+        <p:cNvPr id="1" name="">
+          <a:extLst>
+            <a:ext uri="{FF2B5EF4-FFF2-40B4-BE49-F238E27FC236}">
+              <a16:creationId xmlns:a16="http://schemas.microsoft.com/office/drawing/2014/main" id="{F8A05F81-2991-ABBE-D5B2-2785CB77B015}"/>
+            </a:ext>
+          </a:extLst>
+        </p:cNvPr>
+        <p:cNvGrpSpPr/>
+        <p:nvPr/>
+      </p:nvGrpSpPr>
+      <p:grpSpPr>
+        <a:xfrm>
+          <a:off x="0" y="0"/>
+          <a:ext cx="0" cy="0"/>
+          <a:chOff x="0" y="0"/>
+          <a:chExt cx="0" cy="0"/>
+        </a:xfrm>
+      </p:grpSpPr>
+      <p:sp>
+        <p:nvSpPr>
+          <p:cNvPr id="5" name="Title 4">
+            <a:extLst>
+              <a:ext uri="{FF2B5EF4-FFF2-40B4-BE49-F238E27FC236}">
+                <a16:creationId xmlns:a16="http://schemas.microsoft.com/office/drawing/2014/main" id="{02021068-A05D-E987-B51F-71A3805FF182}"/>
+              </a:ext>
+            </a:extLst>
+          </p:cNvPr>
+          <p:cNvSpPr>
+            <a:spLocks noGrp="1"/>
+          </p:cNvSpPr>
+          <p:nvPr>
+            <p:ph type="title"/>
+          </p:nvPr>
+        </p:nvSpPr>
+        <p:spPr/>
+        <p:txBody>
+          <a:bodyPr/>
+          <a:lstStyle/>
+          <a:p>
+            <a:endParaRPr lang="pt-BR"/>
+          </a:p>
+        </p:txBody>
+      </p:sp>
+      <p:pic>
+        <p:nvPicPr>
+          <p:cNvPr id="11" name="Content Placeholder 10" descr="A graph with a line&#10;&#10;Description automatically generated">
+            <a:extLst>
+              <a:ext uri="{FF2B5EF4-FFF2-40B4-BE49-F238E27FC236}">
+                <a16:creationId xmlns:a16="http://schemas.microsoft.com/office/drawing/2014/main" id="{3D3D8E06-99CA-5ABA-CD68-0D961FA77ED8}"/>
+              </a:ext>
+            </a:extLst>
+          </p:cNvPr>
+          <p:cNvPicPr>
+            <a:picLocks noGrp="1" noChangeAspect="1"/>
+          </p:cNvPicPr>
+          <p:nvPr>
+            <p:ph idx="1"/>
+          </p:nvPr>
+        </p:nvPicPr>
+        <p:blipFill>
+          <a:blip r:embed="rId2">
+            <a:extLst>
+              <a:ext uri="{28A0092B-C50C-407E-A947-70E740481C1C}">
+                <a14:useLocalDpi xmlns:a14="http://schemas.microsoft.com/office/drawing/2010/main" val="0"/>
+              </a:ext>
+            </a:extLst>
+          </a:blip>
+          <a:stretch>
+            <a:fillRect/>
+          </a:stretch>
+        </p:blipFill>
+        <p:spPr>
+          <a:xfrm>
+            <a:off x="109364" y="136603"/>
+            <a:ext cx="3962063" cy="3108170"/>
+          </a:xfrm>
+        </p:spPr>
+      </p:pic>
+      <p:pic>
+        <p:nvPicPr>
+          <p:cNvPr id="13" name="Picture 12" descr="A graph with a line&#10;&#10;Description automatically generated">
+            <a:extLst>
+              <a:ext uri="{FF2B5EF4-FFF2-40B4-BE49-F238E27FC236}">
+                <a16:creationId xmlns:a16="http://schemas.microsoft.com/office/drawing/2014/main" id="{E716060A-96E3-DAE2-521A-6DF290D0FFC3}"/>
+              </a:ext>
+            </a:extLst>
+          </p:cNvPr>
+          <p:cNvPicPr>
+            <a:picLocks noChangeAspect="1"/>
+          </p:cNvPicPr>
+          <p:nvPr/>
+        </p:nvPicPr>
+        <p:blipFill>
+          <a:blip r:embed="rId3">
+            <a:extLst>
+              <a:ext uri="{28A0092B-C50C-407E-A947-70E740481C1C}">
+                <a14:useLocalDpi xmlns:a14="http://schemas.microsoft.com/office/drawing/2010/main" val="0"/>
+              </a:ext>
+            </a:extLst>
+          </a:blip>
+          <a:stretch>
+            <a:fillRect/>
+          </a:stretch>
+        </p:blipFill>
+        <p:spPr>
+          <a:xfrm>
+            <a:off x="4024038" y="119124"/>
+            <a:ext cx="3962064" cy="3108170"/>
+          </a:xfrm>
+          <a:prstGeom prst="rect">
+            <a:avLst/>
+          </a:prstGeom>
+        </p:spPr>
+      </p:pic>
+      <p:pic>
+        <p:nvPicPr>
+          <p:cNvPr id="15" name="Picture 14" descr="A graph with a line&#10;&#10;Description automatically generated">
+            <a:extLst>
+              <a:ext uri="{FF2B5EF4-FFF2-40B4-BE49-F238E27FC236}">
+                <a16:creationId xmlns:a16="http://schemas.microsoft.com/office/drawing/2014/main" id="{4A961078-DD2A-A3F9-A64C-B53367A9A076}"/>
+              </a:ext>
+            </a:extLst>
+          </p:cNvPr>
+          <p:cNvPicPr>
+            <a:picLocks noChangeAspect="1"/>
+          </p:cNvPicPr>
+          <p:nvPr/>
+        </p:nvPicPr>
+        <p:blipFill>
+          <a:blip r:embed="rId4">
+            <a:extLst>
+              <a:ext uri="{28A0092B-C50C-407E-A947-70E740481C1C}">
+                <a14:useLocalDpi xmlns:a14="http://schemas.microsoft.com/office/drawing/2010/main" val="0"/>
+              </a:ext>
+            </a:extLst>
+          </a:blip>
+          <a:stretch>
+            <a:fillRect/>
+          </a:stretch>
+        </p:blipFill>
+        <p:spPr>
+          <a:xfrm>
+            <a:off x="7986101" y="17479"/>
+            <a:ext cx="4113914" cy="3227294"/>
+          </a:xfrm>
+          <a:prstGeom prst="rect">
+            <a:avLst/>
+          </a:prstGeom>
+        </p:spPr>
+      </p:pic>
+      <p:pic>
+        <p:nvPicPr>
+          <p:cNvPr id="17" name="Picture 16" descr="A graph with a line&#10;&#10;Description automatically generated">
+            <a:extLst>
+              <a:ext uri="{FF2B5EF4-FFF2-40B4-BE49-F238E27FC236}">
+                <a16:creationId xmlns:a16="http://schemas.microsoft.com/office/drawing/2014/main" id="{CA183F7D-11A5-9371-5C81-E6AB8FE8FCA8}"/>
+              </a:ext>
+            </a:extLst>
+          </p:cNvPr>
+          <p:cNvPicPr>
+            <a:picLocks noChangeAspect="1"/>
+          </p:cNvPicPr>
+          <p:nvPr/>
+        </p:nvPicPr>
+        <p:blipFill>
+          <a:blip r:embed="rId5">
+            <a:extLst>
+              <a:ext uri="{28A0092B-C50C-407E-A947-70E740481C1C}">
+                <a14:useLocalDpi xmlns:a14="http://schemas.microsoft.com/office/drawing/2010/main" val="0"/>
+              </a:ext>
+            </a:extLst>
+          </a:blip>
+          <a:stretch>
+            <a:fillRect/>
+          </a:stretch>
+        </p:blipFill>
+        <p:spPr>
+          <a:xfrm>
+            <a:off x="109365" y="3227294"/>
+            <a:ext cx="3914674" cy="3070994"/>
+          </a:xfrm>
+          <a:prstGeom prst="rect">
+            <a:avLst/>
+          </a:prstGeom>
+        </p:spPr>
+      </p:pic>
+      <p:pic>
+        <p:nvPicPr>
+          <p:cNvPr id="19" name="Picture 18" descr="A graph with a line&#10;&#10;Description automatically generated">
+            <a:extLst>
+              <a:ext uri="{FF2B5EF4-FFF2-40B4-BE49-F238E27FC236}">
+                <a16:creationId xmlns:a16="http://schemas.microsoft.com/office/drawing/2014/main" id="{C2D924CF-9492-0563-448E-A0FC8F0DBBE1}"/>
+              </a:ext>
+            </a:extLst>
+          </p:cNvPr>
+          <p:cNvPicPr>
+            <a:picLocks noChangeAspect="1"/>
+          </p:cNvPicPr>
+          <p:nvPr/>
+        </p:nvPicPr>
+        <p:blipFill>
+          <a:blip r:embed="rId6">
+            <a:extLst>
+              <a:ext uri="{28A0092B-C50C-407E-A947-70E740481C1C}">
+                <a14:useLocalDpi xmlns:a14="http://schemas.microsoft.com/office/drawing/2010/main" val="0"/>
+              </a:ext>
+            </a:extLst>
+          </a:blip>
+          <a:stretch>
+            <a:fillRect/>
+          </a:stretch>
+        </p:blipFill>
+        <p:spPr>
+          <a:xfrm>
+            <a:off x="4071428" y="3227294"/>
+            <a:ext cx="3962064" cy="3108170"/>
+          </a:xfrm>
+          <a:prstGeom prst="rect">
+            <a:avLst/>
+          </a:prstGeom>
+        </p:spPr>
+      </p:pic>
+    </p:spTree>
+    <p:extLst>
+      <p:ext uri="{BB962C8B-B14F-4D97-AF65-F5344CB8AC3E}">
+        <p14:creationId xmlns:p14="http://schemas.microsoft.com/office/powerpoint/2010/main" val="1930919987"/>
+      </p:ext>
+    </p:extLst>
+  </p:cSld>
+  <p:clrMapOvr>
+    <a:masterClrMapping/>
+  </p:clrMapOvr>
+</p:sld>
+</file>
+
+<file path=ppt/slides/slide13.xml><?xml version="1.0" encoding="utf-8"?>
+<p:sld xmlns:a="http://schemas.openxmlformats.org/drawingml/2006/main" xmlns:r="http://schemas.openxmlformats.org/officeDocument/2006/relationships" xmlns:p="http://schemas.openxmlformats.org/presentationml/2006/main">
+  <p:cSld>
+    <p:spTree>
+      <p:nvGrpSpPr>
+        <p:cNvPr id="1" name="">
+          <a:extLst>
+            <a:ext uri="{FF2B5EF4-FFF2-40B4-BE49-F238E27FC236}">
+              <a16:creationId xmlns:a16="http://schemas.microsoft.com/office/drawing/2014/main" id="{3F545763-71BD-1EB2-B835-78D57B16A2F2}"/>
+            </a:ext>
+          </a:extLst>
+        </p:cNvPr>
+        <p:cNvGrpSpPr/>
+        <p:nvPr/>
+      </p:nvGrpSpPr>
+      <p:grpSpPr>
+        <a:xfrm>
+          <a:off x="0" y="0"/>
+          <a:ext cx="0" cy="0"/>
+          <a:chOff x="0" y="0"/>
+          <a:chExt cx="0" cy="0"/>
+        </a:xfrm>
+      </p:grpSpPr>
+      <p:sp>
+        <p:nvSpPr>
+          <p:cNvPr id="5" name="Title 4">
+            <a:extLst>
+              <a:ext uri="{FF2B5EF4-FFF2-40B4-BE49-F238E27FC236}">
+                <a16:creationId xmlns:a16="http://schemas.microsoft.com/office/drawing/2014/main" id="{506C5EBF-5C0A-3650-D9B0-D28646EA196D}"/>
+              </a:ext>
+            </a:extLst>
+          </p:cNvPr>
+          <p:cNvSpPr>
+            <a:spLocks noGrp="1"/>
+          </p:cNvSpPr>
+          <p:nvPr>
+            <p:ph type="title"/>
+          </p:nvPr>
+        </p:nvSpPr>
+        <p:spPr/>
+        <p:txBody>
+          <a:bodyPr/>
+          <a:lstStyle/>
+          <a:p>
+            <a:endParaRPr lang="pt-BR"/>
+          </a:p>
+        </p:txBody>
+      </p:sp>
+      <p:pic>
+        <p:nvPicPr>
+          <p:cNvPr id="8" name="Content Placeholder 7">
+            <a:extLst>
+              <a:ext uri="{FF2B5EF4-FFF2-40B4-BE49-F238E27FC236}">
+                <a16:creationId xmlns:a16="http://schemas.microsoft.com/office/drawing/2014/main" id="{129CD892-2DB0-D598-0460-66B6DF87E63D}"/>
+              </a:ext>
+            </a:extLst>
+          </p:cNvPr>
+          <p:cNvPicPr>
+            <a:picLocks noGrp="1" noChangeAspect="1"/>
+          </p:cNvPicPr>
+          <p:nvPr>
+            <p:ph idx="1"/>
+          </p:nvPr>
+        </p:nvPicPr>
+        <p:blipFill>
+          <a:blip r:embed="rId2"/>
+          <a:stretch>
+            <a:fillRect/>
+          </a:stretch>
+        </p:blipFill>
+        <p:spPr>
+          <a:xfrm>
+            <a:off x="6207713" y="1690688"/>
+            <a:ext cx="5582429" cy="3458058"/>
+          </a:xfrm>
+        </p:spPr>
+      </p:pic>
+      <p:pic>
+        <p:nvPicPr>
+          <p:cNvPr id="6" name="Picture 5">
+            <a:extLst>
+              <a:ext uri="{FF2B5EF4-FFF2-40B4-BE49-F238E27FC236}">
+                <a16:creationId xmlns:a16="http://schemas.microsoft.com/office/drawing/2014/main" id="{484CA51C-9558-8A29-7779-806E131CCB56}"/>
+              </a:ext>
+            </a:extLst>
+          </p:cNvPr>
+          <p:cNvPicPr>
+            <a:picLocks noChangeAspect="1"/>
+          </p:cNvPicPr>
+          <p:nvPr/>
+        </p:nvPicPr>
+        <p:blipFill>
+          <a:blip r:embed="rId3"/>
+          <a:stretch>
+            <a:fillRect/>
+          </a:stretch>
+        </p:blipFill>
+        <p:spPr>
+          <a:xfrm>
+            <a:off x="663389" y="990503"/>
+            <a:ext cx="5544324" cy="4858428"/>
+          </a:xfrm>
+          <a:prstGeom prst="rect">
+            <a:avLst/>
+          </a:prstGeom>
+        </p:spPr>
+      </p:pic>
+    </p:spTree>
+    <p:extLst>
+      <p:ext uri="{BB962C8B-B14F-4D97-AF65-F5344CB8AC3E}">
+        <p14:creationId xmlns:p14="http://schemas.microsoft.com/office/powerpoint/2010/main" val="2306607336"/>
+      </p:ext>
+    </p:extLst>
+  </p:cSld>
+  <p:clrMapOvr>
+    <a:masterClrMapping/>
+  </p:clrMapOvr>
+</p:sld>
+</file>
+
+<file path=ppt/slides/slide14.xml><?xml version="1.0" encoding="utf-8"?>
+<p:sld xmlns:a="http://schemas.openxmlformats.org/drawingml/2006/main" xmlns:r="http://schemas.openxmlformats.org/officeDocument/2006/relationships" xmlns:p="http://schemas.openxmlformats.org/presentationml/2006/main">
+  <p:cSld>
+    <p:spTree>
+      <p:nvGrpSpPr>
+        <p:cNvPr id="1" name=""/>
+        <p:cNvGrpSpPr/>
+        <p:nvPr/>
+      </p:nvGrpSpPr>
+      <p:grpSpPr>
+        <a:xfrm>
+          <a:off x="0" y="0"/>
+          <a:ext cx="0" cy="0"/>
+          <a:chOff x="0" y="0"/>
+          <a:chExt cx="0" cy="0"/>
+        </a:xfrm>
+      </p:grpSpPr>
+      <p:sp>
+        <p:nvSpPr>
+          <p:cNvPr id="2" name="Title 1">
+            <a:extLst>
+              <a:ext uri="{FF2B5EF4-FFF2-40B4-BE49-F238E27FC236}">
+                <a16:creationId xmlns:a16="http://schemas.microsoft.com/office/drawing/2014/main" id="{93D6BCEA-5822-99B2-34A6-A0DC5EB7FAA4}"/>
+              </a:ext>
+            </a:extLst>
+          </p:cNvPr>
+          <p:cNvSpPr>
+            <a:spLocks noGrp="1"/>
+          </p:cNvSpPr>
+          <p:nvPr>
+            <p:ph type="title"/>
+          </p:nvPr>
+        </p:nvSpPr>
+        <p:spPr/>
+        <p:txBody>
+          <a:bodyPr/>
+          <a:lstStyle/>
+          <a:p>
+            <a:endParaRPr lang="pt-BR"/>
+          </a:p>
+        </p:txBody>
+      </p:sp>
+      <p:pic>
+        <p:nvPicPr>
+          <p:cNvPr id="7" name="Content Placeholder 6">
+            <a:extLst>
+              <a:ext uri="{FF2B5EF4-FFF2-40B4-BE49-F238E27FC236}">
+                <a16:creationId xmlns:a16="http://schemas.microsoft.com/office/drawing/2014/main" id="{2E8E7F6F-3BD0-C97F-8D5B-0D4E19B40924}"/>
+              </a:ext>
+            </a:extLst>
+          </p:cNvPr>
+          <p:cNvPicPr>
+            <a:picLocks noGrp="1" noChangeAspect="1"/>
+          </p:cNvPicPr>
+          <p:nvPr>
+            <p:ph idx="1"/>
+          </p:nvPr>
+        </p:nvPicPr>
+        <p:blipFill>
+          <a:blip r:embed="rId2"/>
+          <a:stretch>
+            <a:fillRect/>
+          </a:stretch>
+        </p:blipFill>
+        <p:spPr>
+          <a:xfrm>
+            <a:off x="6096000" y="1690688"/>
+            <a:ext cx="5582429" cy="3543795"/>
+          </a:xfrm>
+        </p:spPr>
+      </p:pic>
+      <p:pic>
+        <p:nvPicPr>
+          <p:cNvPr id="5" name="Picture 4">
+            <a:extLst>
+              <a:ext uri="{FF2B5EF4-FFF2-40B4-BE49-F238E27FC236}">
+                <a16:creationId xmlns:a16="http://schemas.microsoft.com/office/drawing/2014/main" id="{F9F0FBB4-0275-8861-8930-E19891CE75CF}"/>
+              </a:ext>
+            </a:extLst>
+          </p:cNvPr>
+          <p:cNvPicPr>
+            <a:picLocks noChangeAspect="1"/>
+          </p:cNvPicPr>
+          <p:nvPr/>
+        </p:nvPicPr>
+        <p:blipFill>
+          <a:blip r:embed="rId3"/>
+          <a:stretch>
+            <a:fillRect/>
+          </a:stretch>
+        </p:blipFill>
+        <p:spPr>
+          <a:xfrm>
+            <a:off x="627887" y="1061950"/>
+            <a:ext cx="5468113" cy="4801270"/>
+          </a:xfrm>
+          <a:prstGeom prst="rect">
+            <a:avLst/>
+          </a:prstGeom>
+        </p:spPr>
+      </p:pic>
+    </p:spTree>
+    <p:extLst>
+      <p:ext uri="{BB962C8B-B14F-4D97-AF65-F5344CB8AC3E}">
+        <p14:creationId xmlns:p14="http://schemas.microsoft.com/office/powerpoint/2010/main" val="2106239545"/>
+      </p:ext>
+    </p:extLst>
+  </p:cSld>
+  <p:clrMapOvr>
+    <a:masterClrMapping/>
+  </p:clrMapOvr>
+</p:sld>
+</file>
+
+<file path=ppt/slides/slide15.xml><?xml version="1.0" encoding="utf-8"?>
+<p:sld xmlns:a="http://schemas.openxmlformats.org/drawingml/2006/main" xmlns:r="http://schemas.openxmlformats.org/officeDocument/2006/relationships" xmlns:p="http://schemas.openxmlformats.org/presentationml/2006/main">
+  <p:cSld>
+    <p:spTree>
+      <p:nvGrpSpPr>
+        <p:cNvPr id="1" name="">
+          <a:extLst>
+            <a:ext uri="{FF2B5EF4-FFF2-40B4-BE49-F238E27FC236}">
+              <a16:creationId xmlns:a16="http://schemas.microsoft.com/office/drawing/2014/main" id="{373FF8B2-DB66-56D9-67A9-E7573638DD01}"/>
+            </a:ext>
+          </a:extLst>
+        </p:cNvPr>
+        <p:cNvGrpSpPr/>
+        <p:nvPr/>
+      </p:nvGrpSpPr>
+      <p:grpSpPr>
+        <a:xfrm>
+          <a:off x="0" y="0"/>
+          <a:ext cx="0" cy="0"/>
+          <a:chOff x="0" y="0"/>
+          <a:chExt cx="0" cy="0"/>
+        </a:xfrm>
+      </p:grpSpPr>
+      <p:sp>
+        <p:nvSpPr>
+          <p:cNvPr id="2" name="Title 1">
+            <a:extLst>
+              <a:ext uri="{FF2B5EF4-FFF2-40B4-BE49-F238E27FC236}">
+                <a16:creationId xmlns:a16="http://schemas.microsoft.com/office/drawing/2014/main" id="{AB0977C6-8A3E-F9E4-8E8E-DAE69760BB7A}"/>
+              </a:ext>
+            </a:extLst>
+          </p:cNvPr>
+          <p:cNvSpPr>
+            <a:spLocks noGrp="1"/>
+          </p:cNvSpPr>
+          <p:nvPr>
+            <p:ph type="title"/>
+          </p:nvPr>
+        </p:nvSpPr>
+        <p:spPr/>
+        <p:txBody>
+          <a:bodyPr/>
+          <a:lstStyle/>
+          <a:p>
+            <a:r>
+              <a:rPr lang="pt-BR" noProof="0" dirty="0"/>
+              <a:t>Descrição estatística dos clusters em 2019</a:t>
+            </a:r>
+          </a:p>
+        </p:txBody>
+      </p:sp>
+      <p:sp>
+        <p:nvSpPr>
+          <p:cNvPr id="3" name="Content Placeholder 2">
+            <a:extLst>
+              <a:ext uri="{FF2B5EF4-FFF2-40B4-BE49-F238E27FC236}">
+                <a16:creationId xmlns:a16="http://schemas.microsoft.com/office/drawing/2014/main" id="{7744DD3C-8FE3-C436-8AD3-26E882FDB0CE}"/>
+              </a:ext>
+            </a:extLst>
+          </p:cNvPr>
+          <p:cNvSpPr>
+            <a:spLocks noGrp="1"/>
+          </p:cNvSpPr>
+          <p:nvPr>
+            <p:ph idx="1"/>
+          </p:nvPr>
+        </p:nvSpPr>
+        <p:spPr>
+          <a:xfrm>
+            <a:off x="8848164" y="1690688"/>
+            <a:ext cx="2505635" cy="4486275"/>
+          </a:xfrm>
+        </p:spPr>
+        <p:txBody>
+          <a:bodyPr>
+            <a:normAutofit/>
+          </a:bodyPr>
+          <a:lstStyle/>
+          <a:p>
+            <a:pPr marL="0" indent="0">
+              <a:buNone/>
+            </a:pPr>
+            <a:r>
+              <a:rPr lang="pt-BR" noProof="0" dirty="0"/>
+              <a:t>Melhor cluster de 2019: 2</a:t>
+            </a:r>
+          </a:p>
+        </p:txBody>
+      </p:sp>
+      <p:pic>
+        <p:nvPicPr>
+          <p:cNvPr id="5" name="Picture 4">
+            <a:extLst>
+              <a:ext uri="{FF2B5EF4-FFF2-40B4-BE49-F238E27FC236}">
+                <a16:creationId xmlns:a16="http://schemas.microsoft.com/office/drawing/2014/main" id="{A80BF29C-3138-2A3D-73FD-65FED8A9EEE3}"/>
+              </a:ext>
+            </a:extLst>
+          </p:cNvPr>
+          <p:cNvPicPr>
+            <a:picLocks noChangeAspect="1"/>
+          </p:cNvPicPr>
+          <p:nvPr/>
+        </p:nvPicPr>
+        <p:blipFill>
+          <a:blip r:embed="rId2"/>
+          <a:stretch>
+            <a:fillRect/>
+          </a:stretch>
+        </p:blipFill>
+        <p:spPr>
+          <a:xfrm>
+            <a:off x="838200" y="1357737"/>
+            <a:ext cx="7849695" cy="5287113"/>
+          </a:xfrm>
+          <a:prstGeom prst="rect">
+            <a:avLst/>
+          </a:prstGeom>
+        </p:spPr>
+      </p:pic>
+    </p:spTree>
+    <p:extLst>
+      <p:ext uri="{BB962C8B-B14F-4D97-AF65-F5344CB8AC3E}">
+        <p14:creationId xmlns:p14="http://schemas.microsoft.com/office/powerpoint/2010/main" val="3290763339"/>
+      </p:ext>
+    </p:extLst>
+  </p:cSld>
+  <p:clrMapOvr>
+    <a:masterClrMapping/>
+  </p:clrMapOvr>
+</p:sld>
+</file>
+
+<file path=ppt/slides/slide16.xml><?xml version="1.0" encoding="utf-8"?>
+<p:sld xmlns:a="http://schemas.openxmlformats.org/drawingml/2006/main" xmlns:r="http://schemas.openxmlformats.org/officeDocument/2006/relationships" xmlns:p="http://schemas.openxmlformats.org/presentationml/2006/main">
+  <p:cSld>
+    <p:spTree>
+      <p:nvGrpSpPr>
+        <p:cNvPr id="1" name="">
+          <a:extLst>
+            <a:ext uri="{FF2B5EF4-FFF2-40B4-BE49-F238E27FC236}">
+              <a16:creationId xmlns:a16="http://schemas.microsoft.com/office/drawing/2014/main" id="{394D96C4-5B67-C5CA-FE6B-36FF493B7941}"/>
+            </a:ext>
+          </a:extLst>
+        </p:cNvPr>
+        <p:cNvGrpSpPr/>
+        <p:nvPr/>
+      </p:nvGrpSpPr>
+      <p:grpSpPr>
+        <a:xfrm>
+          <a:off x="0" y="0"/>
+          <a:ext cx="0" cy="0"/>
+          <a:chOff x="0" y="0"/>
+          <a:chExt cx="0" cy="0"/>
+        </a:xfrm>
+      </p:grpSpPr>
+      <p:sp>
+        <p:nvSpPr>
+          <p:cNvPr id="2" name="Title 1">
+            <a:extLst>
+              <a:ext uri="{FF2B5EF4-FFF2-40B4-BE49-F238E27FC236}">
+                <a16:creationId xmlns:a16="http://schemas.microsoft.com/office/drawing/2014/main" id="{CDC034C8-60D4-B4BB-8B4E-AEC3C37B99D4}"/>
+              </a:ext>
+            </a:extLst>
+          </p:cNvPr>
+          <p:cNvSpPr>
+            <a:spLocks noGrp="1"/>
+          </p:cNvSpPr>
+          <p:nvPr>
+            <p:ph type="title"/>
+          </p:nvPr>
+        </p:nvSpPr>
+        <p:spPr/>
+        <p:txBody>
+          <a:bodyPr/>
+          <a:lstStyle/>
+          <a:p>
+            <a:r>
+              <a:rPr lang="pt-BR" noProof="0" dirty="0"/>
+              <a:t>Descrição estatística dos clusters em 2020</a:t>
+            </a:r>
+          </a:p>
+        </p:txBody>
+      </p:sp>
+      <p:sp>
+        <p:nvSpPr>
+          <p:cNvPr id="3" name="Content Placeholder 2">
+            <a:extLst>
+              <a:ext uri="{FF2B5EF4-FFF2-40B4-BE49-F238E27FC236}">
+                <a16:creationId xmlns:a16="http://schemas.microsoft.com/office/drawing/2014/main" id="{77B7E190-243A-2E2F-07A7-A42A25358995}"/>
+              </a:ext>
+            </a:extLst>
+          </p:cNvPr>
+          <p:cNvSpPr>
+            <a:spLocks noGrp="1"/>
+          </p:cNvSpPr>
+          <p:nvPr>
+            <p:ph idx="1"/>
+          </p:nvPr>
+        </p:nvSpPr>
+        <p:spPr>
+          <a:xfrm>
+            <a:off x="8848164" y="1690688"/>
+            <a:ext cx="2505635" cy="4486275"/>
+          </a:xfrm>
+        </p:spPr>
+        <p:txBody>
+          <a:bodyPr>
+            <a:normAutofit/>
+          </a:bodyPr>
+          <a:lstStyle/>
+          <a:p>
+            <a:pPr marL="0" indent="0">
+              <a:buNone/>
+            </a:pPr>
+            <a:r>
+              <a:rPr lang="pt-BR" noProof="0" dirty="0"/>
+              <a:t>Melhor cluster de 2020: 0</a:t>
+            </a:r>
+          </a:p>
+        </p:txBody>
+      </p:sp>
+      <p:pic>
+        <p:nvPicPr>
+          <p:cNvPr id="5" name="Picture 4">
+            <a:extLst>
+              <a:ext uri="{FF2B5EF4-FFF2-40B4-BE49-F238E27FC236}">
+                <a16:creationId xmlns:a16="http://schemas.microsoft.com/office/drawing/2014/main" id="{F9B4A7FB-CCFA-E756-80CE-1F1C7A1F5A8C}"/>
+              </a:ext>
+            </a:extLst>
+          </p:cNvPr>
+          <p:cNvPicPr>
+            <a:picLocks noChangeAspect="1"/>
+          </p:cNvPicPr>
+          <p:nvPr/>
+        </p:nvPicPr>
+        <p:blipFill>
+          <a:blip r:embed="rId2"/>
+          <a:stretch>
+            <a:fillRect/>
+          </a:stretch>
+        </p:blipFill>
+        <p:spPr>
+          <a:xfrm>
+            <a:off x="838200" y="1357737"/>
+            <a:ext cx="7849695" cy="5287113"/>
+          </a:xfrm>
+          <a:prstGeom prst="rect">
+            <a:avLst/>
+          </a:prstGeom>
+        </p:spPr>
+      </p:pic>
+      <p:pic>
+        <p:nvPicPr>
+          <p:cNvPr id="6" name="Picture 5">
+            <a:extLst>
+              <a:ext uri="{FF2B5EF4-FFF2-40B4-BE49-F238E27FC236}">
+                <a16:creationId xmlns:a16="http://schemas.microsoft.com/office/drawing/2014/main" id="{8A1B71C9-696C-3F50-D2E8-DCCBBFFBEBC0}"/>
+              </a:ext>
+            </a:extLst>
+          </p:cNvPr>
+          <p:cNvPicPr>
+            <a:picLocks noChangeAspect="1"/>
+          </p:cNvPicPr>
+          <p:nvPr/>
+        </p:nvPicPr>
+        <p:blipFill>
+          <a:blip r:embed="rId3"/>
+          <a:stretch>
+            <a:fillRect/>
+          </a:stretch>
+        </p:blipFill>
+        <p:spPr>
+          <a:xfrm>
+            <a:off x="838199" y="1357737"/>
+            <a:ext cx="7821116" cy="5268060"/>
+          </a:xfrm>
+          <a:prstGeom prst="rect">
+            <a:avLst/>
+          </a:prstGeom>
+        </p:spPr>
+      </p:pic>
+    </p:spTree>
+    <p:extLst>
+      <p:ext uri="{BB962C8B-B14F-4D97-AF65-F5344CB8AC3E}">
+        <p14:creationId xmlns:p14="http://schemas.microsoft.com/office/powerpoint/2010/main" val="901623517"/>
+      </p:ext>
+    </p:extLst>
+  </p:cSld>
+  <p:clrMapOvr>
+    <a:masterClrMapping/>
+  </p:clrMapOvr>
+</p:sld>
+</file>
+
+<file path=ppt/slides/slide17.xml><?xml version="1.0" encoding="utf-8"?>
+<p:sld xmlns:a="http://schemas.openxmlformats.org/drawingml/2006/main" xmlns:r="http://schemas.openxmlformats.org/officeDocument/2006/relationships" xmlns:p="http://schemas.openxmlformats.org/presentationml/2006/main">
+  <p:cSld>
+    <p:spTree>
+      <p:nvGrpSpPr>
+        <p:cNvPr id="1" name="">
+          <a:extLst>
+            <a:ext uri="{FF2B5EF4-FFF2-40B4-BE49-F238E27FC236}">
+              <a16:creationId xmlns:a16="http://schemas.microsoft.com/office/drawing/2014/main" id="{CA6F98A2-D407-7111-335D-B0F7A355D836}"/>
+            </a:ext>
+          </a:extLst>
+        </p:cNvPr>
+        <p:cNvGrpSpPr/>
+        <p:nvPr/>
+      </p:nvGrpSpPr>
+      <p:grpSpPr>
+        <a:xfrm>
+          <a:off x="0" y="0"/>
+          <a:ext cx="0" cy="0"/>
+          <a:chOff x="0" y="0"/>
+          <a:chExt cx="0" cy="0"/>
+        </a:xfrm>
+      </p:grpSpPr>
+      <p:sp>
+        <p:nvSpPr>
+          <p:cNvPr id="2" name="Title 1">
+            <a:extLst>
+              <a:ext uri="{FF2B5EF4-FFF2-40B4-BE49-F238E27FC236}">
+                <a16:creationId xmlns:a16="http://schemas.microsoft.com/office/drawing/2014/main" id="{35A6D98E-136C-8C81-BADD-3D6781BDD979}"/>
+              </a:ext>
+            </a:extLst>
+          </p:cNvPr>
+          <p:cNvSpPr>
+            <a:spLocks noGrp="1"/>
+          </p:cNvSpPr>
+          <p:nvPr>
+            <p:ph type="title"/>
+          </p:nvPr>
+        </p:nvSpPr>
+        <p:spPr/>
+        <p:txBody>
+          <a:bodyPr/>
+          <a:lstStyle/>
+          <a:p>
+            <a:r>
+              <a:rPr lang="pt-BR" noProof="0" dirty="0"/>
+              <a:t>Descrição estatística dos clusters em 2021</a:t>
+            </a:r>
+          </a:p>
+        </p:txBody>
+      </p:sp>
+      <p:sp>
+        <p:nvSpPr>
+          <p:cNvPr id="3" name="Content Placeholder 2">
+            <a:extLst>
+              <a:ext uri="{FF2B5EF4-FFF2-40B4-BE49-F238E27FC236}">
+                <a16:creationId xmlns:a16="http://schemas.microsoft.com/office/drawing/2014/main" id="{4881EC0E-9476-90B1-274E-AE59242B5592}"/>
+              </a:ext>
+            </a:extLst>
+          </p:cNvPr>
+          <p:cNvSpPr>
+            <a:spLocks noGrp="1"/>
+          </p:cNvSpPr>
+          <p:nvPr>
+            <p:ph idx="1"/>
+          </p:nvPr>
+        </p:nvSpPr>
+        <p:spPr>
+          <a:xfrm>
+            <a:off x="8848164" y="1690688"/>
+            <a:ext cx="2505635" cy="4486275"/>
+          </a:xfrm>
+        </p:spPr>
+        <p:txBody>
+          <a:bodyPr>
+            <a:normAutofit/>
+          </a:bodyPr>
+          <a:lstStyle/>
+          <a:p>
+            <a:pPr marL="0" indent="0">
+              <a:buNone/>
+            </a:pPr>
+            <a:r>
+              <a:rPr lang="pt-BR" noProof="0" dirty="0"/>
+              <a:t>Melhor cluster de 2021: </a:t>
+            </a:r>
+            <a:r>
+              <a:rPr lang="pt-BR" dirty="0"/>
+              <a:t>1</a:t>
+            </a:r>
+            <a:endParaRPr lang="pt-BR" noProof="0" dirty="0"/>
+          </a:p>
+        </p:txBody>
+      </p:sp>
+      <p:pic>
+        <p:nvPicPr>
+          <p:cNvPr id="5" name="Picture 4">
+            <a:extLst>
+              <a:ext uri="{FF2B5EF4-FFF2-40B4-BE49-F238E27FC236}">
+                <a16:creationId xmlns:a16="http://schemas.microsoft.com/office/drawing/2014/main" id="{B120D8C6-1BEA-ACB1-49D1-1BDE36397F32}"/>
+              </a:ext>
+            </a:extLst>
+          </p:cNvPr>
+          <p:cNvPicPr>
+            <a:picLocks noChangeAspect="1"/>
+          </p:cNvPicPr>
+          <p:nvPr/>
+        </p:nvPicPr>
+        <p:blipFill>
+          <a:blip r:embed="rId2"/>
+          <a:stretch>
+            <a:fillRect/>
+          </a:stretch>
+        </p:blipFill>
+        <p:spPr>
+          <a:xfrm>
+            <a:off x="838200" y="1357737"/>
+            <a:ext cx="7849695" cy="5287113"/>
+          </a:xfrm>
+          <a:prstGeom prst="rect">
+            <a:avLst/>
+          </a:prstGeom>
+        </p:spPr>
+      </p:pic>
+      <p:pic>
+        <p:nvPicPr>
+          <p:cNvPr id="7" name="Picture 6">
+            <a:extLst>
+              <a:ext uri="{FF2B5EF4-FFF2-40B4-BE49-F238E27FC236}">
+                <a16:creationId xmlns:a16="http://schemas.microsoft.com/office/drawing/2014/main" id="{CD799093-514E-019A-7B2E-CD66AFF54391}"/>
+              </a:ext>
+            </a:extLst>
+          </p:cNvPr>
+          <p:cNvPicPr>
+            <a:picLocks noChangeAspect="1"/>
+          </p:cNvPicPr>
+          <p:nvPr/>
+        </p:nvPicPr>
+        <p:blipFill>
+          <a:blip r:embed="rId3"/>
+          <a:stretch>
+            <a:fillRect/>
+          </a:stretch>
+        </p:blipFill>
+        <p:spPr>
+          <a:xfrm>
+            <a:off x="904884" y="1357737"/>
+            <a:ext cx="7783011" cy="5220429"/>
+          </a:xfrm>
+          <a:prstGeom prst="rect">
+            <a:avLst/>
+          </a:prstGeom>
+        </p:spPr>
+      </p:pic>
+    </p:spTree>
+    <p:extLst>
+      <p:ext uri="{BB962C8B-B14F-4D97-AF65-F5344CB8AC3E}">
+        <p14:creationId xmlns:p14="http://schemas.microsoft.com/office/powerpoint/2010/main" val="4141512073"/>
+      </p:ext>
+    </p:extLst>
+  </p:cSld>
+  <p:clrMapOvr>
+    <a:masterClrMapping/>
+  </p:clrMapOvr>
+</p:sld>
+</file>
+
+<file path=ppt/slides/slide18.xml><?xml version="1.0" encoding="utf-8"?>
+<p:sld xmlns:a="http://schemas.openxmlformats.org/drawingml/2006/main" xmlns:r="http://schemas.openxmlformats.org/officeDocument/2006/relationships" xmlns:p="http://schemas.openxmlformats.org/presentationml/2006/main">
+  <p:cSld>
+    <p:spTree>
+      <p:nvGrpSpPr>
+        <p:cNvPr id="1" name="">
+          <a:extLst>
+            <a:ext uri="{FF2B5EF4-FFF2-40B4-BE49-F238E27FC236}">
+              <a16:creationId xmlns:a16="http://schemas.microsoft.com/office/drawing/2014/main" id="{2E6CE25A-7282-7C38-3922-2EF57FD651E7}"/>
+            </a:ext>
+          </a:extLst>
+        </p:cNvPr>
+        <p:cNvGrpSpPr/>
+        <p:nvPr/>
+      </p:nvGrpSpPr>
+      <p:grpSpPr>
+        <a:xfrm>
+          <a:off x="0" y="0"/>
+          <a:ext cx="0" cy="0"/>
+          <a:chOff x="0" y="0"/>
+          <a:chExt cx="0" cy="0"/>
+        </a:xfrm>
+      </p:grpSpPr>
+      <p:sp>
+        <p:nvSpPr>
+          <p:cNvPr id="2" name="Title 1">
+            <a:extLst>
+              <a:ext uri="{FF2B5EF4-FFF2-40B4-BE49-F238E27FC236}">
+                <a16:creationId xmlns:a16="http://schemas.microsoft.com/office/drawing/2014/main" id="{D76C9532-855B-3C8D-0568-5EE1DC9ADD5D}"/>
+              </a:ext>
+            </a:extLst>
+          </p:cNvPr>
+          <p:cNvSpPr>
+            <a:spLocks noGrp="1"/>
+          </p:cNvSpPr>
+          <p:nvPr>
+            <p:ph type="title"/>
+          </p:nvPr>
+        </p:nvSpPr>
+        <p:spPr/>
+        <p:txBody>
+          <a:bodyPr/>
+          <a:lstStyle/>
+          <a:p>
+            <a:r>
+              <a:rPr lang="pt-BR" noProof="0" dirty="0"/>
+              <a:t>Descrição estatística dos clusters em</a:t>
+            </a:r>
+            <a:r>
+              <a:rPr lang="pt-BR" dirty="0"/>
+              <a:t> 2022</a:t>
+            </a:r>
+            <a:endParaRPr lang="pt-BR" noProof="0" dirty="0"/>
+          </a:p>
+        </p:txBody>
+      </p:sp>
+      <p:sp>
+        <p:nvSpPr>
+          <p:cNvPr id="3" name="Content Placeholder 2">
+            <a:extLst>
+              <a:ext uri="{FF2B5EF4-FFF2-40B4-BE49-F238E27FC236}">
+                <a16:creationId xmlns:a16="http://schemas.microsoft.com/office/drawing/2014/main" id="{B722A24B-4255-563E-CE49-39571940EFCF}"/>
+              </a:ext>
+            </a:extLst>
+          </p:cNvPr>
+          <p:cNvSpPr>
+            <a:spLocks noGrp="1"/>
+          </p:cNvSpPr>
+          <p:nvPr>
+            <p:ph idx="1"/>
+          </p:nvPr>
+        </p:nvSpPr>
+        <p:spPr>
+          <a:xfrm>
+            <a:off x="8848164" y="1690688"/>
+            <a:ext cx="2505635" cy="4486275"/>
+          </a:xfrm>
+        </p:spPr>
+        <p:txBody>
+          <a:bodyPr>
+            <a:normAutofit/>
+          </a:bodyPr>
+          <a:lstStyle/>
+          <a:p>
+            <a:pPr marL="0" indent="0">
+              <a:buNone/>
+            </a:pPr>
+            <a:r>
+              <a:rPr lang="pt-BR" noProof="0" dirty="0"/>
+              <a:t>Melhor cluster de 2022: </a:t>
+            </a:r>
+            <a:r>
+              <a:rPr lang="pt-BR" dirty="0"/>
+              <a:t>1</a:t>
+            </a:r>
+            <a:endParaRPr lang="pt-BR" noProof="0" dirty="0"/>
+          </a:p>
+        </p:txBody>
+      </p:sp>
+      <p:pic>
+        <p:nvPicPr>
+          <p:cNvPr id="6" name="Picture 5">
+            <a:extLst>
+              <a:ext uri="{FF2B5EF4-FFF2-40B4-BE49-F238E27FC236}">
+                <a16:creationId xmlns:a16="http://schemas.microsoft.com/office/drawing/2014/main" id="{D0FF1F3C-EEE9-E016-BEBB-AF2FF8D9B8C4}"/>
+              </a:ext>
+            </a:extLst>
+          </p:cNvPr>
+          <p:cNvPicPr>
+            <a:picLocks noChangeAspect="1"/>
+          </p:cNvPicPr>
+          <p:nvPr/>
+        </p:nvPicPr>
+        <p:blipFill>
+          <a:blip r:embed="rId2"/>
+          <a:stretch>
+            <a:fillRect/>
+          </a:stretch>
+        </p:blipFill>
+        <p:spPr>
+          <a:xfrm>
+            <a:off x="838199" y="1328375"/>
+            <a:ext cx="7744906" cy="5210902"/>
+          </a:xfrm>
+          <a:prstGeom prst="rect">
+            <a:avLst/>
+          </a:prstGeom>
+        </p:spPr>
+      </p:pic>
+    </p:spTree>
+    <p:extLst>
+      <p:ext uri="{BB962C8B-B14F-4D97-AF65-F5344CB8AC3E}">
+        <p14:creationId xmlns:p14="http://schemas.microsoft.com/office/powerpoint/2010/main" val="1279882209"/>
+      </p:ext>
+    </p:extLst>
+  </p:cSld>
+  <p:clrMapOvr>
+    <a:masterClrMapping/>
+  </p:clrMapOvr>
+</p:sld>
+</file>
+
+<file path=ppt/slides/slide19.xml><?xml version="1.0" encoding="utf-8"?>
+<p:sld xmlns:a="http://schemas.openxmlformats.org/drawingml/2006/main" xmlns:r="http://schemas.openxmlformats.org/officeDocument/2006/relationships" xmlns:p="http://schemas.openxmlformats.org/presentationml/2006/main">
+  <p:cSld>
+    <p:spTree>
+      <p:nvGrpSpPr>
+        <p:cNvPr id="1" name="">
+          <a:extLst>
+            <a:ext uri="{FF2B5EF4-FFF2-40B4-BE49-F238E27FC236}">
+              <a16:creationId xmlns:a16="http://schemas.microsoft.com/office/drawing/2014/main" id="{5EFE17F1-3A66-BA77-86E7-F9F9A193AFC0}"/>
+            </a:ext>
+          </a:extLst>
+        </p:cNvPr>
+        <p:cNvGrpSpPr/>
+        <p:nvPr/>
+      </p:nvGrpSpPr>
+      <p:grpSpPr>
+        <a:xfrm>
+          <a:off x="0" y="0"/>
+          <a:ext cx="0" cy="0"/>
+          <a:chOff x="0" y="0"/>
+          <a:chExt cx="0" cy="0"/>
+        </a:xfrm>
+      </p:grpSpPr>
+      <p:sp>
+        <p:nvSpPr>
+          <p:cNvPr id="2" name="Title 1">
+            <a:extLst>
+              <a:ext uri="{FF2B5EF4-FFF2-40B4-BE49-F238E27FC236}">
+                <a16:creationId xmlns:a16="http://schemas.microsoft.com/office/drawing/2014/main" id="{B1E045C1-8087-D29C-F8A6-4662310BFCC9}"/>
+              </a:ext>
+            </a:extLst>
+          </p:cNvPr>
+          <p:cNvSpPr>
+            <a:spLocks noGrp="1"/>
+          </p:cNvSpPr>
+          <p:nvPr>
+            <p:ph type="title"/>
+          </p:nvPr>
+        </p:nvSpPr>
+        <p:spPr/>
+        <p:txBody>
+          <a:bodyPr/>
+          <a:lstStyle/>
+          <a:p>
+            <a:r>
+              <a:rPr lang="pt-BR" noProof="0" dirty="0"/>
+              <a:t>Descrição estatística dos clusters em 2023</a:t>
+            </a:r>
+          </a:p>
+        </p:txBody>
+      </p:sp>
+      <p:sp>
+        <p:nvSpPr>
+          <p:cNvPr id="3" name="Content Placeholder 2">
+            <a:extLst>
+              <a:ext uri="{FF2B5EF4-FFF2-40B4-BE49-F238E27FC236}">
+                <a16:creationId xmlns:a16="http://schemas.microsoft.com/office/drawing/2014/main" id="{D6E3DB18-9CA6-04A3-A023-F9A87F8FA9F0}"/>
+              </a:ext>
+            </a:extLst>
+          </p:cNvPr>
+          <p:cNvSpPr>
+            <a:spLocks noGrp="1"/>
+          </p:cNvSpPr>
+          <p:nvPr>
+            <p:ph idx="1"/>
+          </p:nvPr>
+        </p:nvSpPr>
+        <p:spPr>
+          <a:xfrm>
+            <a:off x="8848164" y="1690688"/>
+            <a:ext cx="2505635" cy="4486275"/>
+          </a:xfrm>
+        </p:spPr>
+        <p:txBody>
+          <a:bodyPr>
+            <a:normAutofit/>
+          </a:bodyPr>
+          <a:lstStyle/>
+          <a:p>
+            <a:pPr marL="0" indent="0">
+              <a:buNone/>
+            </a:pPr>
+            <a:r>
+              <a:rPr lang="pt-BR" noProof="0" dirty="0"/>
+              <a:t>Melhor cluster de 202</a:t>
+            </a:r>
+            <a:r>
+              <a:rPr lang="pt-BR" dirty="0"/>
+              <a:t>3</a:t>
+            </a:r>
+            <a:r>
+              <a:rPr lang="pt-BR" noProof="0" dirty="0"/>
+              <a:t>: </a:t>
+            </a:r>
+            <a:r>
+              <a:rPr lang="pt-BR" dirty="0"/>
+              <a:t>1</a:t>
+            </a:r>
+            <a:endParaRPr lang="pt-BR" noProof="0" dirty="0"/>
+          </a:p>
+        </p:txBody>
+      </p:sp>
+      <p:pic>
+        <p:nvPicPr>
+          <p:cNvPr id="6" name="Picture 5">
+            <a:extLst>
+              <a:ext uri="{FF2B5EF4-FFF2-40B4-BE49-F238E27FC236}">
+                <a16:creationId xmlns:a16="http://schemas.microsoft.com/office/drawing/2014/main" id="{767CEC06-E04D-49E1-C7AC-25ABBA8D8CE4}"/>
+              </a:ext>
+            </a:extLst>
+          </p:cNvPr>
+          <p:cNvPicPr>
+            <a:picLocks noChangeAspect="1"/>
+          </p:cNvPicPr>
+          <p:nvPr/>
+        </p:nvPicPr>
+        <p:blipFill>
+          <a:blip r:embed="rId2"/>
+          <a:stretch>
+            <a:fillRect/>
+          </a:stretch>
+        </p:blipFill>
+        <p:spPr>
+          <a:xfrm>
+            <a:off x="838199" y="1328375"/>
+            <a:ext cx="7744906" cy="5210902"/>
+          </a:xfrm>
+          <a:prstGeom prst="rect">
+            <a:avLst/>
+          </a:prstGeom>
+        </p:spPr>
+      </p:pic>
+      <p:pic>
+        <p:nvPicPr>
+          <p:cNvPr id="5" name="Picture 4">
+            <a:extLst>
+              <a:ext uri="{FF2B5EF4-FFF2-40B4-BE49-F238E27FC236}">
+                <a16:creationId xmlns:a16="http://schemas.microsoft.com/office/drawing/2014/main" id="{C0526513-5881-36D2-E995-91586C5C4727}"/>
+              </a:ext>
+            </a:extLst>
+          </p:cNvPr>
+          <p:cNvPicPr>
+            <a:picLocks noChangeAspect="1"/>
+          </p:cNvPicPr>
+          <p:nvPr/>
+        </p:nvPicPr>
+        <p:blipFill>
+          <a:blip r:embed="rId3"/>
+          <a:stretch>
+            <a:fillRect/>
+          </a:stretch>
+        </p:blipFill>
+        <p:spPr>
+          <a:xfrm>
+            <a:off x="838199" y="1395059"/>
+            <a:ext cx="7744906" cy="5144218"/>
+          </a:xfrm>
+          <a:prstGeom prst="rect">
+            <a:avLst/>
+          </a:prstGeom>
+        </p:spPr>
+      </p:pic>
+    </p:spTree>
+    <p:extLst>
+      <p:ext uri="{BB962C8B-B14F-4D97-AF65-F5344CB8AC3E}">
+        <p14:creationId xmlns:p14="http://schemas.microsoft.com/office/powerpoint/2010/main" val="2830331274"/>
+      </p:ext>
+    </p:extLst>
+  </p:cSld>
+  <p:clrMapOvr>
+    <a:masterClrMapping/>
+  </p:clrMapOvr>
+</p:sld>
+</file>
+
 <file path=ppt/slides/slide2.xml><?xml version="1.0" encoding="utf-8"?>
 <p:sld xmlns:a="http://schemas.openxmlformats.org/drawingml/2006/main" xmlns:r="http://schemas.openxmlformats.org/officeDocument/2006/relationships" xmlns:p="http://schemas.openxmlformats.org/presentationml/2006/main">
   <p:cSld>
@@ -3507,6 +5013,13 @@
             </a:r>
           </a:p>
           <a:p>
+            <a:pPr lvl="1"/>
+            <a:r>
+              <a:rPr lang="pt-BR" dirty="0"/>
+              <a:t>Empresas com alto DR tem retornos menores comparados aos demais</a:t>
+            </a:r>
+          </a:p>
+          <a:p>
             <a:r>
               <a:rPr lang="pt-BR" noProof="0" dirty="0"/>
               <a:t>Tentar encontrar </a:t>
@@ -3536,6 +5049,436 @@
     <p:extLst>
       <p:ext uri="{BB962C8B-B14F-4D97-AF65-F5344CB8AC3E}">
         <p14:creationId xmlns:p14="http://schemas.microsoft.com/office/powerpoint/2010/main" val="848221992"/>
+      </p:ext>
+    </p:extLst>
+  </p:cSld>
+  <p:clrMapOvr>
+    <a:masterClrMapping/>
+  </p:clrMapOvr>
+</p:sld>
+</file>
+
+<file path=ppt/slides/slide20.xml><?xml version="1.0" encoding="utf-8"?>
+<p:sld xmlns:a="http://schemas.openxmlformats.org/drawingml/2006/main" xmlns:r="http://schemas.openxmlformats.org/officeDocument/2006/relationships" xmlns:p="http://schemas.openxmlformats.org/presentationml/2006/main">
+  <p:cSld>
+    <p:spTree>
+      <p:nvGrpSpPr>
+        <p:cNvPr id="1" name="">
+          <a:extLst>
+            <a:ext uri="{FF2B5EF4-FFF2-40B4-BE49-F238E27FC236}">
+              <a16:creationId xmlns:a16="http://schemas.microsoft.com/office/drawing/2014/main" id="{8735CD4F-9073-4484-8D6F-59F59E028D4B}"/>
+            </a:ext>
+          </a:extLst>
+        </p:cNvPr>
+        <p:cNvGrpSpPr/>
+        <p:nvPr/>
+      </p:nvGrpSpPr>
+      <p:grpSpPr>
+        <a:xfrm>
+          <a:off x="0" y="0"/>
+          <a:ext cx="0" cy="0"/>
+          <a:chOff x="0" y="0"/>
+          <a:chExt cx="0" cy="0"/>
+        </a:xfrm>
+      </p:grpSpPr>
+      <p:sp>
+        <p:nvSpPr>
+          <p:cNvPr id="7" name="Title 6">
+            <a:extLst>
+              <a:ext uri="{FF2B5EF4-FFF2-40B4-BE49-F238E27FC236}">
+                <a16:creationId xmlns:a16="http://schemas.microsoft.com/office/drawing/2014/main" id="{E72A6F9B-FA5C-E8AB-5AEA-5BC16DAD27FC}"/>
+              </a:ext>
+            </a:extLst>
+          </p:cNvPr>
+          <p:cNvSpPr>
+            <a:spLocks noGrp="1"/>
+          </p:cNvSpPr>
+          <p:nvPr>
+            <p:ph type="title"/>
+          </p:nvPr>
+        </p:nvSpPr>
+        <p:spPr/>
+        <p:txBody>
+          <a:bodyPr/>
+          <a:lstStyle/>
+          <a:p>
+            <a:r>
+              <a:rPr lang="en-GB" dirty="0"/>
+              <a:t>2023</a:t>
+            </a:r>
+            <a:endParaRPr lang="pt-BR" dirty="0"/>
+          </a:p>
+        </p:txBody>
+      </p:sp>
+      <p:pic>
+        <p:nvPicPr>
+          <p:cNvPr id="13" name="Content Placeholder 12">
+            <a:extLst>
+              <a:ext uri="{FF2B5EF4-FFF2-40B4-BE49-F238E27FC236}">
+                <a16:creationId xmlns:a16="http://schemas.microsoft.com/office/drawing/2014/main" id="{E1C4CD92-2C5E-0CA1-9246-A949D313F5F2}"/>
+              </a:ext>
+            </a:extLst>
+          </p:cNvPr>
+          <p:cNvPicPr>
+            <a:picLocks noGrp="1" noChangeAspect="1"/>
+          </p:cNvPicPr>
+          <p:nvPr>
+            <p:ph idx="1"/>
+          </p:nvPr>
+        </p:nvPicPr>
+        <p:blipFill>
+          <a:blip r:embed="rId2"/>
+          <a:stretch>
+            <a:fillRect/>
+          </a:stretch>
+        </p:blipFill>
+        <p:spPr>
+          <a:xfrm>
+            <a:off x="99227" y="1465729"/>
+            <a:ext cx="12092773" cy="4367090"/>
+          </a:xfrm>
+        </p:spPr>
+      </p:pic>
+    </p:spTree>
+    <p:extLst>
+      <p:ext uri="{BB962C8B-B14F-4D97-AF65-F5344CB8AC3E}">
+        <p14:creationId xmlns:p14="http://schemas.microsoft.com/office/powerpoint/2010/main" val="3818131115"/>
+      </p:ext>
+    </p:extLst>
+  </p:cSld>
+  <p:clrMapOvr>
+    <a:masterClrMapping/>
+  </p:clrMapOvr>
+</p:sld>
+</file>
+
+<file path=ppt/slides/slide21.xml><?xml version="1.0" encoding="utf-8"?>
+<p:sld xmlns:a="http://schemas.openxmlformats.org/drawingml/2006/main" xmlns:r="http://schemas.openxmlformats.org/officeDocument/2006/relationships" xmlns:p="http://schemas.openxmlformats.org/presentationml/2006/main">
+  <p:cSld>
+    <p:spTree>
+      <p:nvGrpSpPr>
+        <p:cNvPr id="1" name="">
+          <a:extLst>
+            <a:ext uri="{FF2B5EF4-FFF2-40B4-BE49-F238E27FC236}">
+              <a16:creationId xmlns:a16="http://schemas.microsoft.com/office/drawing/2014/main" id="{F9C15F65-3790-657E-CB58-910A19939247}"/>
+            </a:ext>
+          </a:extLst>
+        </p:cNvPr>
+        <p:cNvGrpSpPr/>
+        <p:nvPr/>
+      </p:nvGrpSpPr>
+      <p:grpSpPr>
+        <a:xfrm>
+          <a:off x="0" y="0"/>
+          <a:ext cx="0" cy="0"/>
+          <a:chOff x="0" y="0"/>
+          <a:chExt cx="0" cy="0"/>
+        </a:xfrm>
+      </p:grpSpPr>
+      <p:sp>
+        <p:nvSpPr>
+          <p:cNvPr id="2" name="Title 1">
+            <a:extLst>
+              <a:ext uri="{FF2B5EF4-FFF2-40B4-BE49-F238E27FC236}">
+                <a16:creationId xmlns:a16="http://schemas.microsoft.com/office/drawing/2014/main" id="{2919F11B-97EB-7E1F-B03E-6303732C9D2B}"/>
+              </a:ext>
+            </a:extLst>
+          </p:cNvPr>
+          <p:cNvSpPr>
+            <a:spLocks noGrp="1"/>
+          </p:cNvSpPr>
+          <p:nvPr>
+            <p:ph type="title"/>
+          </p:nvPr>
+        </p:nvSpPr>
+        <p:spPr/>
+        <p:txBody>
+          <a:bodyPr/>
+          <a:lstStyle/>
+          <a:p>
+            <a:r>
+              <a:rPr lang="pt-BR" noProof="0" dirty="0"/>
+              <a:t>Olhando mais de perto...</a:t>
+            </a:r>
+          </a:p>
+        </p:txBody>
+      </p:sp>
+      <p:sp>
+        <p:nvSpPr>
+          <p:cNvPr id="3" name="Content Placeholder 2">
+            <a:extLst>
+              <a:ext uri="{FF2B5EF4-FFF2-40B4-BE49-F238E27FC236}">
+                <a16:creationId xmlns:a16="http://schemas.microsoft.com/office/drawing/2014/main" id="{1A79DEDE-855A-008F-E117-CB14A1DD266E}"/>
+              </a:ext>
+            </a:extLst>
+          </p:cNvPr>
+          <p:cNvSpPr>
+            <a:spLocks noGrp="1"/>
+          </p:cNvSpPr>
+          <p:nvPr>
+            <p:ph idx="1"/>
+          </p:nvPr>
+        </p:nvSpPr>
+        <p:spPr/>
+        <p:txBody>
+          <a:bodyPr>
+            <a:normAutofit/>
+          </a:bodyPr>
+          <a:lstStyle/>
+          <a:p>
+            <a:pPr>
+              <a:buFontTx/>
+              <a:buChar char="-"/>
+            </a:pPr>
+            <a:r>
+              <a:rPr lang="pt-BR" noProof="0" dirty="0"/>
+              <a:t>Os clusters 2:2019, 0:2020, 1:2021, 1:2022, 1:2023 tem as somas ponderadas bem parecidas…</a:t>
+            </a:r>
+          </a:p>
+          <a:p>
+            <a:pPr>
+              <a:buFontTx/>
+              <a:buChar char="-"/>
+            </a:pPr>
+            <a:r>
+              <a:rPr lang="pt-BR" dirty="0"/>
+              <a:t>Os demais clusters tem as somas ponderadas (excluindo AC) bem diferentes dos clusters com maiores rendimentos...</a:t>
+            </a:r>
+          </a:p>
+          <a:p>
+            <a:pPr>
+              <a:buFontTx/>
+              <a:buChar char="-"/>
+            </a:pPr>
+            <a:r>
+              <a:rPr lang="pt-BR" noProof="0" dirty="0"/>
+              <a:t>De fato, empresas com alto DR tem retornos menores comparados aos demais</a:t>
+            </a:r>
+          </a:p>
+        </p:txBody>
+      </p:sp>
+    </p:spTree>
+    <p:extLst>
+      <p:ext uri="{BB962C8B-B14F-4D97-AF65-F5344CB8AC3E}">
+        <p14:creationId xmlns:p14="http://schemas.microsoft.com/office/powerpoint/2010/main" val="1083518829"/>
+      </p:ext>
+    </p:extLst>
+  </p:cSld>
+  <p:clrMapOvr>
+    <a:masterClrMapping/>
+  </p:clrMapOvr>
+</p:sld>
+</file>
+
+<file path=ppt/slides/slide22.xml><?xml version="1.0" encoding="utf-8"?>
+<p:sld xmlns:a="http://schemas.openxmlformats.org/drawingml/2006/main" xmlns:r="http://schemas.openxmlformats.org/officeDocument/2006/relationships" xmlns:p="http://schemas.openxmlformats.org/presentationml/2006/main">
+  <p:cSld>
+    <p:spTree>
+      <p:nvGrpSpPr>
+        <p:cNvPr id="1" name="">
+          <a:extLst>
+            <a:ext uri="{FF2B5EF4-FFF2-40B4-BE49-F238E27FC236}">
+              <a16:creationId xmlns:a16="http://schemas.microsoft.com/office/drawing/2014/main" id="{10D6A09A-026E-E421-2FB7-86D13CA75B76}"/>
+            </a:ext>
+          </a:extLst>
+        </p:cNvPr>
+        <p:cNvGrpSpPr/>
+        <p:nvPr/>
+      </p:nvGrpSpPr>
+      <p:grpSpPr>
+        <a:xfrm>
+          <a:off x="0" y="0"/>
+          <a:ext cx="0" cy="0"/>
+          <a:chOff x="0" y="0"/>
+          <a:chExt cx="0" cy="0"/>
+        </a:xfrm>
+      </p:grpSpPr>
+      <p:sp>
+        <p:nvSpPr>
+          <p:cNvPr id="5" name="Title 4">
+            <a:extLst>
+              <a:ext uri="{FF2B5EF4-FFF2-40B4-BE49-F238E27FC236}">
+                <a16:creationId xmlns:a16="http://schemas.microsoft.com/office/drawing/2014/main" id="{CFD9F93C-B56F-EBD9-A3BD-5F6028C04930}"/>
+              </a:ext>
+            </a:extLst>
+          </p:cNvPr>
+          <p:cNvSpPr>
+            <a:spLocks noGrp="1"/>
+          </p:cNvSpPr>
+          <p:nvPr>
+            <p:ph type="title"/>
+          </p:nvPr>
+        </p:nvSpPr>
+        <p:spPr>
+          <a:xfrm>
+            <a:off x="8390964" y="365125"/>
+            <a:ext cx="2962835" cy="6371851"/>
+          </a:xfrm>
+        </p:spPr>
+        <p:txBody>
+          <a:bodyPr/>
+          <a:lstStyle/>
+          <a:p>
+            <a:r>
+              <a:rPr lang="pt-BR" noProof="0" dirty="0"/>
+              <a:t>Temos uma espécie de padrão!</a:t>
+            </a:r>
+          </a:p>
+        </p:txBody>
+      </p:sp>
+      <p:pic>
+        <p:nvPicPr>
+          <p:cNvPr id="9" name="Picture 8">
+            <a:extLst>
+              <a:ext uri="{FF2B5EF4-FFF2-40B4-BE49-F238E27FC236}">
+                <a16:creationId xmlns:a16="http://schemas.microsoft.com/office/drawing/2014/main" id="{E7A9DBEE-337F-5923-717A-D269ADB826D5}"/>
+              </a:ext>
+            </a:extLst>
+          </p:cNvPr>
+          <p:cNvPicPr>
+            <a:picLocks noChangeAspect="1"/>
+          </p:cNvPicPr>
+          <p:nvPr/>
+        </p:nvPicPr>
+        <p:blipFill>
+          <a:blip r:embed="rId2"/>
+          <a:stretch>
+            <a:fillRect/>
+          </a:stretch>
+        </p:blipFill>
+        <p:spPr>
+          <a:xfrm>
+            <a:off x="99461" y="0"/>
+            <a:ext cx="7849695" cy="1486107"/>
+          </a:xfrm>
+          <a:prstGeom prst="rect">
+            <a:avLst/>
+          </a:prstGeom>
+        </p:spPr>
+      </p:pic>
+      <p:pic>
+        <p:nvPicPr>
+          <p:cNvPr id="11" name="Content Placeholder 10">
+            <a:extLst>
+              <a:ext uri="{FF2B5EF4-FFF2-40B4-BE49-F238E27FC236}">
+                <a16:creationId xmlns:a16="http://schemas.microsoft.com/office/drawing/2014/main" id="{6A9347A1-0DF4-57E8-AABD-7C4DE4931AC5}"/>
+              </a:ext>
+            </a:extLst>
+          </p:cNvPr>
+          <p:cNvPicPr>
+            <a:picLocks noGrp="1" noChangeAspect="1"/>
+          </p:cNvPicPr>
+          <p:nvPr>
+            <p:ph idx="1"/>
+          </p:nvPr>
+        </p:nvPicPr>
+        <p:blipFill>
+          <a:blip r:embed="rId3"/>
+          <a:stretch>
+            <a:fillRect/>
+          </a:stretch>
+        </p:blipFill>
+        <p:spPr>
+          <a:xfrm>
+            <a:off x="80408" y="1303233"/>
+            <a:ext cx="7859222" cy="1505160"/>
+          </a:xfrm>
+        </p:spPr>
+      </p:pic>
+      <p:pic>
+        <p:nvPicPr>
+          <p:cNvPr id="13" name="Picture 12">
+            <a:extLst>
+              <a:ext uri="{FF2B5EF4-FFF2-40B4-BE49-F238E27FC236}">
+                <a16:creationId xmlns:a16="http://schemas.microsoft.com/office/drawing/2014/main" id="{1BB50973-73B9-A0EE-5E52-1DD0DA061543}"/>
+              </a:ext>
+            </a:extLst>
+          </p:cNvPr>
+          <p:cNvPicPr>
+            <a:picLocks noChangeAspect="1"/>
+          </p:cNvPicPr>
+          <p:nvPr/>
+        </p:nvPicPr>
+        <p:blipFill>
+          <a:blip r:embed="rId4"/>
+          <a:stretch>
+            <a:fillRect/>
+          </a:stretch>
+        </p:blipFill>
+        <p:spPr>
+          <a:xfrm>
+            <a:off x="70882" y="2709571"/>
+            <a:ext cx="7821116" cy="1428949"/>
+          </a:xfrm>
+          <a:prstGeom prst="rect">
+            <a:avLst/>
+          </a:prstGeom>
+        </p:spPr>
+      </p:pic>
+      <p:pic>
+        <p:nvPicPr>
+          <p:cNvPr id="15" name="Picture 14">
+            <a:extLst>
+              <a:ext uri="{FF2B5EF4-FFF2-40B4-BE49-F238E27FC236}">
+                <a16:creationId xmlns:a16="http://schemas.microsoft.com/office/drawing/2014/main" id="{6E068C4D-39B0-AE75-58B8-43D7E9DF1B72}"/>
+              </a:ext>
+            </a:extLst>
+          </p:cNvPr>
+          <p:cNvPicPr>
+            <a:picLocks noChangeAspect="1"/>
+          </p:cNvPicPr>
+          <p:nvPr/>
+        </p:nvPicPr>
+        <p:blipFill>
+          <a:blip r:embed="rId5"/>
+          <a:stretch>
+            <a:fillRect/>
+          </a:stretch>
+        </p:blipFill>
+        <p:spPr>
+          <a:xfrm>
+            <a:off x="99461" y="4031857"/>
+            <a:ext cx="7792537" cy="1495634"/>
+          </a:xfrm>
+          <a:prstGeom prst="rect">
+            <a:avLst/>
+          </a:prstGeom>
+        </p:spPr>
+      </p:pic>
+      <p:pic>
+        <p:nvPicPr>
+          <p:cNvPr id="17" name="Picture 16">
+            <a:extLst>
+              <a:ext uri="{FF2B5EF4-FFF2-40B4-BE49-F238E27FC236}">
+                <a16:creationId xmlns:a16="http://schemas.microsoft.com/office/drawing/2014/main" id="{682AC1E7-53D3-8030-3C56-28958ABBDCE2}"/>
+              </a:ext>
+            </a:extLst>
+          </p:cNvPr>
+          <p:cNvPicPr>
+            <a:picLocks noChangeAspect="1"/>
+          </p:cNvPicPr>
+          <p:nvPr/>
+        </p:nvPicPr>
+        <p:blipFill>
+          <a:blip r:embed="rId6"/>
+          <a:stretch>
+            <a:fillRect/>
+          </a:stretch>
+        </p:blipFill>
+        <p:spPr>
+          <a:xfrm>
+            <a:off x="99461" y="5400472"/>
+            <a:ext cx="7802064" cy="1457528"/>
+          </a:xfrm>
+          <a:prstGeom prst="rect">
+            <a:avLst/>
+          </a:prstGeom>
+        </p:spPr>
+      </p:pic>
+    </p:spTree>
+    <p:extLst>
+      <p:ext uri="{BB962C8B-B14F-4D97-AF65-F5344CB8AC3E}">
+        <p14:creationId xmlns:p14="http://schemas.microsoft.com/office/powerpoint/2010/main" val="1122506364"/>
       </p:ext>
     </p:extLst>
   </p:cSld>
@@ -4378,6 +6321,171 @@
     <p:extLst>
       <p:ext uri="{BB962C8B-B14F-4D97-AF65-F5344CB8AC3E}">
         <p14:creationId xmlns:p14="http://schemas.microsoft.com/office/powerpoint/2010/main" val="3099816358"/>
+      </p:ext>
+    </p:extLst>
+  </p:cSld>
+  <p:clrMapOvr>
+    <a:masterClrMapping/>
+  </p:clrMapOvr>
+</p:sld>
+</file>
+
+<file path=ppt/slides/slide9.xml><?xml version="1.0" encoding="utf-8"?>
+<p:sld xmlns:a="http://schemas.openxmlformats.org/drawingml/2006/main" xmlns:r="http://schemas.openxmlformats.org/officeDocument/2006/relationships" xmlns:p="http://schemas.openxmlformats.org/presentationml/2006/main">
+  <p:cSld>
+    <p:spTree>
+      <p:nvGrpSpPr>
+        <p:cNvPr id="1" name="">
+          <a:extLst>
+            <a:ext uri="{FF2B5EF4-FFF2-40B4-BE49-F238E27FC236}">
+              <a16:creationId xmlns:a16="http://schemas.microsoft.com/office/drawing/2014/main" id="{5588C30F-32D6-D3A4-0948-164DD70E2EA5}"/>
+            </a:ext>
+          </a:extLst>
+        </p:cNvPr>
+        <p:cNvGrpSpPr/>
+        <p:nvPr/>
+      </p:nvGrpSpPr>
+      <p:grpSpPr>
+        <a:xfrm>
+          <a:off x="0" y="0"/>
+          <a:ext cx="0" cy="0"/>
+          <a:chOff x="0" y="0"/>
+          <a:chExt cx="0" cy="0"/>
+        </a:xfrm>
+      </p:grpSpPr>
+      <p:sp>
+        <p:nvSpPr>
+          <p:cNvPr id="2" name="Title 1">
+            <a:extLst>
+              <a:ext uri="{FF2B5EF4-FFF2-40B4-BE49-F238E27FC236}">
+                <a16:creationId xmlns:a16="http://schemas.microsoft.com/office/drawing/2014/main" id="{6CC5B45B-A015-4C03-8AC0-1238E8C8EE77}"/>
+              </a:ext>
+            </a:extLst>
+          </p:cNvPr>
+          <p:cNvSpPr>
+            <a:spLocks noGrp="1"/>
+          </p:cNvSpPr>
+          <p:nvPr>
+            <p:ph type="title"/>
+          </p:nvPr>
+        </p:nvSpPr>
+        <p:spPr/>
+        <p:txBody>
+          <a:bodyPr/>
+          <a:lstStyle/>
+          <a:p>
+            <a:r>
+              <a:rPr lang="pt-BR" noProof="0" dirty="0"/>
+              <a:t>Clusterização</a:t>
+            </a:r>
+          </a:p>
+        </p:txBody>
+      </p:sp>
+      <p:sp>
+        <p:nvSpPr>
+          <p:cNvPr id="3" name="Content Placeholder 2">
+            <a:extLst>
+              <a:ext uri="{FF2B5EF4-FFF2-40B4-BE49-F238E27FC236}">
+                <a16:creationId xmlns:a16="http://schemas.microsoft.com/office/drawing/2014/main" id="{645AF443-3D51-5FC5-EFE9-B81DBFEAE72A}"/>
+              </a:ext>
+            </a:extLst>
+          </p:cNvPr>
+          <p:cNvSpPr>
+            <a:spLocks noGrp="1"/>
+          </p:cNvSpPr>
+          <p:nvPr>
+            <p:ph idx="1"/>
+          </p:nvPr>
+        </p:nvSpPr>
+        <p:spPr/>
+        <p:txBody>
+          <a:bodyPr>
+            <a:normAutofit/>
+          </a:bodyPr>
+          <a:lstStyle/>
+          <a:p>
+            <a:r>
+              <a:rPr lang="pt-BR" noProof="0" dirty="0"/>
+              <a:t>O que é </a:t>
+            </a:r>
+            <a:r>
+              <a:rPr lang="pt-BR" noProof="0" dirty="0" err="1"/>
+              <a:t>kmeans</a:t>
+            </a:r>
+            <a:r>
+              <a:rPr lang="pt-BR" noProof="0" dirty="0"/>
+              <a:t>?</a:t>
+            </a:r>
+          </a:p>
+          <a:p>
+            <a:endParaRPr lang="pt-BR" dirty="0"/>
+          </a:p>
+          <a:p>
+            <a:pPr marL="0" indent="0">
+              <a:buNone/>
+            </a:pPr>
+            <a:r>
+              <a:rPr lang="pt-BR" dirty="0"/>
+              <a:t>Dropei a coluna </a:t>
+            </a:r>
+            <a:r>
+              <a:rPr lang="pt-BR" dirty="0" err="1"/>
+              <a:t>industry</a:t>
+            </a:r>
+            <a:r>
+              <a:rPr lang="pt-BR" dirty="0"/>
+              <a:t>, ME_lag1, </a:t>
+            </a:r>
+            <a:r>
+              <a:rPr lang="pt-BR" dirty="0" err="1"/>
+              <a:t>r_i</a:t>
+            </a:r>
+            <a:r>
+              <a:rPr lang="pt-BR" dirty="0"/>
+              <a:t>, r.3.0</a:t>
+            </a:r>
+          </a:p>
+          <a:p>
+            <a:pPr marL="0" indent="0">
+              <a:buNone/>
+            </a:pPr>
+            <a:r>
+              <a:rPr lang="pt-BR" noProof="0" dirty="0"/>
+              <a:t>Separei por ano</a:t>
+            </a:r>
+          </a:p>
+          <a:p>
+            <a:pPr marL="0" indent="0">
+              <a:buNone/>
+            </a:pPr>
+            <a:r>
+              <a:rPr lang="pt-BR" dirty="0"/>
+              <a:t>Normalizei os dados, </a:t>
+            </a:r>
+            <a:r>
+              <a:rPr lang="pt-BR" dirty="0" err="1"/>
+              <a:t>clusterizei</a:t>
+            </a:r>
+            <a:r>
+              <a:rPr lang="pt-BR" dirty="0"/>
+              <a:t> usando AC, CA, DR, OFC, ECI</a:t>
+            </a:r>
+          </a:p>
+          <a:p>
+            <a:pPr marL="0" indent="0">
+              <a:buNone/>
+            </a:pPr>
+            <a:r>
+              <a:rPr lang="pt-BR" noProof="0" dirty="0"/>
+              <a:t>Reduzi a dimensionalidade</a:t>
+            </a:r>
+          </a:p>
+        </p:txBody>
+      </p:sp>
+    </p:spTree>
+    <p:extLst>
+      <p:ext uri="{BB962C8B-B14F-4D97-AF65-F5344CB8AC3E}">
+        <p14:creationId xmlns:p14="http://schemas.microsoft.com/office/powerpoint/2010/main" val="2743461261"/>
       </p:ext>
     </p:extLst>
   </p:cSld>

</xml_diff>